<commit_message>
Add some verbiage for the unnamed module
</commit_message>
<xml_diff>
--- a/java9-modules.pptx
+++ b/java9-modules.pptx
@@ -278,7 +278,7 @@
           <a:p>
             <a:fld id="{76160209-3BD7-E64D-B6F5-A6D624F01F7E}" type="datetimeFigureOut">
               <a:rPr lang="en-US" smtClean="0"/>
-              <a:t>8/28/20</a:t>
+              <a:t>8/29/20</a:t>
             </a:fld>
             <a:endParaRPr lang="en-US"/>
           </a:p>
@@ -476,7 +476,7 @@
           <a:p>
             <a:fld id="{76160209-3BD7-E64D-B6F5-A6D624F01F7E}" type="datetimeFigureOut">
               <a:rPr lang="en-US" smtClean="0"/>
-              <a:t>8/28/20</a:t>
+              <a:t>8/29/20</a:t>
             </a:fld>
             <a:endParaRPr lang="en-US"/>
           </a:p>
@@ -684,7 +684,7 @@
           <a:p>
             <a:fld id="{76160209-3BD7-E64D-B6F5-A6D624F01F7E}" type="datetimeFigureOut">
               <a:rPr lang="en-US" smtClean="0"/>
-              <a:t>8/28/20</a:t>
+              <a:t>8/29/20</a:t>
             </a:fld>
             <a:endParaRPr lang="en-US"/>
           </a:p>
@@ -882,7 +882,7 @@
           <a:p>
             <a:fld id="{76160209-3BD7-E64D-B6F5-A6D624F01F7E}" type="datetimeFigureOut">
               <a:rPr lang="en-US" smtClean="0"/>
-              <a:t>8/28/20</a:t>
+              <a:t>8/29/20</a:t>
             </a:fld>
             <a:endParaRPr lang="en-US"/>
           </a:p>
@@ -1157,7 +1157,7 @@
           <a:p>
             <a:fld id="{76160209-3BD7-E64D-B6F5-A6D624F01F7E}" type="datetimeFigureOut">
               <a:rPr lang="en-US" smtClean="0"/>
-              <a:t>8/28/20</a:t>
+              <a:t>8/29/20</a:t>
             </a:fld>
             <a:endParaRPr lang="en-US"/>
           </a:p>
@@ -1422,7 +1422,7 @@
           <a:p>
             <a:fld id="{76160209-3BD7-E64D-B6F5-A6D624F01F7E}" type="datetimeFigureOut">
               <a:rPr lang="en-US" smtClean="0"/>
-              <a:t>8/28/20</a:t>
+              <a:t>8/29/20</a:t>
             </a:fld>
             <a:endParaRPr lang="en-US"/>
           </a:p>
@@ -1834,7 +1834,7 @@
           <a:p>
             <a:fld id="{76160209-3BD7-E64D-B6F5-A6D624F01F7E}" type="datetimeFigureOut">
               <a:rPr lang="en-US" smtClean="0"/>
-              <a:t>8/28/20</a:t>
+              <a:t>8/29/20</a:t>
             </a:fld>
             <a:endParaRPr lang="en-US"/>
           </a:p>
@@ -1975,7 +1975,7 @@
           <a:p>
             <a:fld id="{76160209-3BD7-E64D-B6F5-A6D624F01F7E}" type="datetimeFigureOut">
               <a:rPr lang="en-US" smtClean="0"/>
-              <a:t>8/28/20</a:t>
+              <a:t>8/29/20</a:t>
             </a:fld>
             <a:endParaRPr lang="en-US"/>
           </a:p>
@@ -2088,7 +2088,7 @@
           <a:p>
             <a:fld id="{76160209-3BD7-E64D-B6F5-A6D624F01F7E}" type="datetimeFigureOut">
               <a:rPr lang="en-US" smtClean="0"/>
-              <a:t>8/28/20</a:t>
+              <a:t>8/29/20</a:t>
             </a:fld>
             <a:endParaRPr lang="en-US"/>
           </a:p>
@@ -2399,7 +2399,7 @@
           <a:p>
             <a:fld id="{76160209-3BD7-E64D-B6F5-A6D624F01F7E}" type="datetimeFigureOut">
               <a:rPr lang="en-US" smtClean="0"/>
-              <a:t>8/28/20</a:t>
+              <a:t>8/29/20</a:t>
             </a:fld>
             <a:endParaRPr lang="en-US"/>
           </a:p>
@@ -2687,7 +2687,7 @@
           <a:p>
             <a:fld id="{76160209-3BD7-E64D-B6F5-A6D624F01F7E}" type="datetimeFigureOut">
               <a:rPr lang="en-US" smtClean="0"/>
-              <a:t>8/28/20</a:t>
+              <a:t>8/29/20</a:t>
             </a:fld>
             <a:endParaRPr lang="en-US"/>
           </a:p>
@@ -2928,7 +2928,7 @@
           <a:p>
             <a:fld id="{76160209-3BD7-E64D-B6F5-A6D624F01F7E}" type="datetimeFigureOut">
               <a:rPr lang="en-US" smtClean="0"/>
-              <a:t>8/28/20</a:t>
+              <a:t>8/29/20</a:t>
             </a:fld>
             <a:endParaRPr lang="en-US"/>
           </a:p>
@@ -7284,7 +7284,9 @@
         </p:nvSpPr>
         <p:spPr/>
         <p:txBody>
-          <a:bodyPr/>
+          <a:bodyPr>
+            <a:normAutofit/>
+          </a:bodyPr>
           <a:lstStyle/>
           <a:p>
             <a:r>
@@ -7296,22 +7298,49 @@
             <a:pPr lvl="1"/>
             <a:r>
               <a:rPr lang="en-US" dirty="0"/>
-              <a:t>Are collections of packages</a:t>
+              <a:t>A collection of packages</a:t>
             </a:r>
           </a:p>
           <a:p>
             <a:pPr lvl="1"/>
             <a:r>
               <a:rPr lang="en-US" dirty="0"/>
-              <a:t>State what other modules they depend </a:t>
+              <a:t>Optionally, resource files and other files such as native libraries</a:t>
             </a:r>
           </a:p>
           <a:p>
             <a:pPr lvl="1"/>
             <a:r>
               <a:rPr lang="en-US" dirty="0"/>
-              <a:t>State what they expose to consumers/clients/rest of world</a:t>
-            </a:r>
+              <a:t>A list of the accessible </a:t>
+            </a:r>
+            <a:r>
+              <a:rPr lang="en-US" i="1" dirty="0"/>
+              <a:t>packages</a:t>
+            </a:r>
+            <a:r>
+              <a:rPr lang="en-US" dirty="0"/>
+              <a:t> in the module</a:t>
+            </a:r>
+          </a:p>
+          <a:p>
+            <a:pPr lvl="1"/>
+            <a:r>
+              <a:rPr lang="en-US" dirty="0"/>
+              <a:t>A list of all </a:t>
+            </a:r>
+            <a:r>
+              <a:rPr lang="en-US" i="1" dirty="0"/>
+              <a:t>modules</a:t>
+            </a:r>
+            <a:r>
+              <a:rPr lang="en-US" dirty="0"/>
+              <a:t> on which this module depends</a:t>
+            </a:r>
+          </a:p>
+          <a:p>
+            <a:pPr lvl="1"/>
+            <a:endParaRPr lang="en-US" dirty="0"/>
           </a:p>
           <a:p>
             <a:r>
@@ -7323,14 +7352,21 @@
             <a:pPr lvl="1"/>
             <a:r>
               <a:rPr lang="en-US" dirty="0"/>
-              <a:t>If we choose to do so, we need to create a module descriptor file</a:t>
+              <a:t>If we choose to do so, we need to create a module descriptor file. </a:t>
+            </a:r>
+          </a:p>
+          <a:p>
+            <a:pPr lvl="2"/>
+            <a:r>
+              <a:rPr lang="en-US" dirty="0"/>
+              <a:t>This “makes” our code a module.</a:t>
             </a:r>
           </a:p>
           <a:p>
             <a:pPr lvl="1"/>
             <a:r>
               <a:rPr lang="en-US" dirty="0"/>
-              <a:t>By convention, called </a:t>
+              <a:t>Special name: </a:t>
             </a:r>
             <a:r>
               <a:rPr lang="en-US" dirty="0">
@@ -8791,7 +8827,7 @@
             <a:pPr lvl="1"/>
             <a:r>
               <a:rPr lang="en-US" sz="2800" dirty="0"/>
-              <a:t>By default, everything is exported and open</a:t>
+              <a:t>Implicitly exports all the package’s types and reads all other modules</a:t>
             </a:r>
           </a:p>
           <a:p>

</xml_diff>